<commit_message>
Update Interim announcement 9LDI1101 Siwon Seo 感情認識に基づく対話システム.pptx
</commit_message>
<xml_diff>
--- a/Presentation/Interim announcement 9LDI1101 Siwon Seo 感情認識に基づく対話システム.pptx
+++ b/Presentation/Interim announcement 9LDI1101 Siwon Seo 感情認識に基づく対話システム.pptx
@@ -5,10 +5,10 @@
     <p:sldMasterId id="2147483648" r:id="rId4"/>
   </p:sldMasterIdLst>
   <p:notesMasterIdLst>
-    <p:notesMasterId r:id="rId15"/>
+    <p:notesMasterId r:id="rId18"/>
   </p:notesMasterIdLst>
   <p:handoutMasterIdLst>
-    <p:handoutMasterId r:id="rId16"/>
+    <p:handoutMasterId r:id="rId19"/>
   </p:handoutMasterIdLst>
   <p:sldIdLst>
     <p:sldId id="2448" r:id="rId5"/>
@@ -21,6 +21,9 @@
     <p:sldId id="2469" r:id="rId12"/>
     <p:sldId id="2466" r:id="rId13"/>
     <p:sldId id="2436" r:id="rId14"/>
+    <p:sldId id="280" r:id="rId15"/>
+    <p:sldId id="2470" r:id="rId16"/>
+    <p:sldId id="2471" r:id="rId17"/>
   </p:sldIdLst>
   <p:sldSz cx="12192000" cy="6858000"/>
   <p:notesSz cx="6858000" cy="9144000"/>
@@ -860,6 +863,182 @@
 </p:notes>
 </file>
 
+<file path=ppt/notesSlides/notesSlide10.xml><?xml version="1.0" encoding="utf-8"?>
+<p:notes xmlns:a="http://schemas.openxmlformats.org/drawingml/2006/main" xmlns:r="http://schemas.openxmlformats.org/officeDocument/2006/relationships" xmlns:p="http://schemas.openxmlformats.org/presentationml/2006/main">
+  <p:cSld>
+    <p:spTree>
+      <p:nvGrpSpPr>
+        <p:cNvPr id="1" name=""/>
+        <p:cNvGrpSpPr/>
+        <p:nvPr/>
+      </p:nvGrpSpPr>
+      <p:grpSpPr>
+        <a:xfrm>
+          <a:off x="0" y="0"/>
+          <a:ext cx="0" cy="0"/>
+          <a:chOff x="0" y="0"/>
+          <a:chExt cx="0" cy="0"/>
+        </a:xfrm>
+      </p:grpSpPr>
+      <p:sp>
+        <p:nvSpPr>
+          <p:cNvPr id="2" name="スライド イメージ プレースホルダー 1"/>
+          <p:cNvSpPr>
+            <a:spLocks noGrp="1" noRot="1" noChangeAspect="1"/>
+          </p:cNvSpPr>
+          <p:nvPr>
+            <p:ph type="sldImg"/>
+          </p:nvPr>
+        </p:nvSpPr>
+        <p:spPr/>
+      </p:sp>
+      <p:sp>
+        <p:nvSpPr>
+          <p:cNvPr id="3" name="ノート プレースホルダー 2"/>
+          <p:cNvSpPr>
+            <a:spLocks noGrp="1"/>
+          </p:cNvSpPr>
+          <p:nvPr>
+            <p:ph type="body" idx="1"/>
+          </p:nvPr>
+        </p:nvSpPr>
+        <p:spPr/>
+        <p:txBody>
+          <a:bodyPr/>
+          <a:lstStyle/>
+          <a:p>
+            <a:endParaRPr kumimoji="1" lang="ja-JP" altLang="en-US" dirty="0"/>
+          </a:p>
+        </p:txBody>
+      </p:sp>
+      <p:sp>
+        <p:nvSpPr>
+          <p:cNvPr id="4" name="スライド番号プレースホルダー 3"/>
+          <p:cNvSpPr>
+            <a:spLocks noGrp="1"/>
+          </p:cNvSpPr>
+          <p:nvPr>
+            <p:ph type="sldNum" sz="quarter" idx="5"/>
+          </p:nvPr>
+        </p:nvSpPr>
+        <p:spPr/>
+        <p:txBody>
+          <a:bodyPr/>
+          <a:lstStyle/>
+          <a:p>
+            <a:fld id="{228B34ED-4CDD-41C9-90F7-D768D5559A6F}" type="slidenum">
+              <a:rPr lang="en-US" altLang="ja-JP" smtClean="0"/>
+              <a:pPr/>
+              <a:t>11</a:t>
+            </a:fld>
+            <a:endParaRPr lang="ja-JP" altLang="en-US">
+              <a:latin typeface="Meiryo UI" panose="020B0604030504040204" pitchFamily="50" charset="-128"/>
+              <a:ea typeface="Meiryo UI" panose="020B0604030504040204" pitchFamily="50" charset="-128"/>
+            </a:endParaRPr>
+          </a:p>
+        </p:txBody>
+      </p:sp>
+    </p:spTree>
+    <p:extLst>
+      <p:ext uri="{BB962C8B-B14F-4D97-AF65-F5344CB8AC3E}">
+        <p14:creationId xmlns:p14="http://schemas.microsoft.com/office/powerpoint/2010/main" val="3407923267"/>
+      </p:ext>
+    </p:extLst>
+  </p:cSld>
+  <p:clrMapOvr>
+    <a:masterClrMapping/>
+  </p:clrMapOvr>
+</p:notes>
+</file>
+
+<file path=ppt/notesSlides/notesSlide11.xml><?xml version="1.0" encoding="utf-8"?>
+<p:notes xmlns:a="http://schemas.openxmlformats.org/drawingml/2006/main" xmlns:r="http://schemas.openxmlformats.org/officeDocument/2006/relationships" xmlns:p="http://schemas.openxmlformats.org/presentationml/2006/main">
+  <p:cSld>
+    <p:spTree>
+      <p:nvGrpSpPr>
+        <p:cNvPr id="1" name=""/>
+        <p:cNvGrpSpPr/>
+        <p:nvPr/>
+      </p:nvGrpSpPr>
+      <p:grpSpPr>
+        <a:xfrm>
+          <a:off x="0" y="0"/>
+          <a:ext cx="0" cy="0"/>
+          <a:chOff x="0" y="0"/>
+          <a:chExt cx="0" cy="0"/>
+        </a:xfrm>
+      </p:grpSpPr>
+      <p:sp>
+        <p:nvSpPr>
+          <p:cNvPr id="2" name="スライド イメージ プレースホルダー 1"/>
+          <p:cNvSpPr>
+            <a:spLocks noGrp="1" noRot="1" noChangeAspect="1"/>
+          </p:cNvSpPr>
+          <p:nvPr>
+            <p:ph type="sldImg"/>
+          </p:nvPr>
+        </p:nvSpPr>
+        <p:spPr/>
+      </p:sp>
+      <p:sp>
+        <p:nvSpPr>
+          <p:cNvPr id="3" name="ノート プレースホルダー 2"/>
+          <p:cNvSpPr>
+            <a:spLocks noGrp="1"/>
+          </p:cNvSpPr>
+          <p:nvPr>
+            <p:ph type="body" idx="1"/>
+          </p:nvPr>
+        </p:nvSpPr>
+        <p:spPr/>
+        <p:txBody>
+          <a:bodyPr/>
+          <a:lstStyle/>
+          <a:p>
+            <a:endParaRPr kumimoji="1" lang="ja-JP" altLang="en-US" dirty="0"/>
+          </a:p>
+        </p:txBody>
+      </p:sp>
+      <p:sp>
+        <p:nvSpPr>
+          <p:cNvPr id="4" name="スライド番号プレースホルダー 3"/>
+          <p:cNvSpPr>
+            <a:spLocks noGrp="1"/>
+          </p:cNvSpPr>
+          <p:nvPr>
+            <p:ph type="sldNum" sz="quarter" idx="5"/>
+          </p:nvPr>
+        </p:nvSpPr>
+        <p:spPr/>
+        <p:txBody>
+          <a:bodyPr/>
+          <a:lstStyle/>
+          <a:p>
+            <a:fld id="{228B34ED-4CDD-41C9-90F7-D768D5559A6F}" type="slidenum">
+              <a:rPr lang="en-US" altLang="ja-JP" smtClean="0"/>
+              <a:pPr/>
+              <a:t>13</a:t>
+            </a:fld>
+            <a:endParaRPr lang="ja-JP" altLang="en-US">
+              <a:latin typeface="Meiryo UI" panose="020B0604030504040204" pitchFamily="50" charset="-128"/>
+              <a:ea typeface="Meiryo UI" panose="020B0604030504040204" pitchFamily="50" charset="-128"/>
+            </a:endParaRPr>
+          </a:p>
+        </p:txBody>
+      </p:sp>
+    </p:spTree>
+    <p:extLst>
+      <p:ext uri="{BB962C8B-B14F-4D97-AF65-F5344CB8AC3E}">
+        <p14:creationId xmlns:p14="http://schemas.microsoft.com/office/powerpoint/2010/main" val="1770137503"/>
+      </p:ext>
+    </p:extLst>
+  </p:cSld>
+  <p:clrMapOvr>
+    <a:masterClrMapping/>
+  </p:clrMapOvr>
+</p:notes>
+</file>
+
 <file path=ppt/notesSlides/notesSlide2.xml><?xml version="1.0" encoding="utf-8"?>
 <p:notes xmlns:a="http://schemas.openxmlformats.org/drawingml/2006/main" xmlns:r="http://schemas.openxmlformats.org/officeDocument/2006/relationships" xmlns:p="http://schemas.openxmlformats.org/presentationml/2006/main">
   <p:cSld>
@@ -3400,6 +3579,212 @@
 </p:sldLayout>
 </file>
 
+<file path=ppt/slideLayouts/slideLayout12.xml><?xml version="1.0" encoding="utf-8"?>
+<p:sldLayout xmlns:a="http://schemas.openxmlformats.org/drawingml/2006/main" xmlns:r="http://schemas.openxmlformats.org/officeDocument/2006/relationships" xmlns:p="http://schemas.openxmlformats.org/presentationml/2006/main" type="obj">
+  <p:cSld name="タイトルとコンテンツ">
+    <p:spTree>
+      <p:nvGrpSpPr>
+        <p:cNvPr id="1" name=""/>
+        <p:cNvGrpSpPr/>
+        <p:nvPr/>
+      </p:nvGrpSpPr>
+      <p:grpSpPr>
+        <a:xfrm>
+          <a:off x="0" y="0"/>
+          <a:ext cx="0" cy="0"/>
+          <a:chOff x="0" y="0"/>
+          <a:chExt cx="0" cy="0"/>
+        </a:xfrm>
+      </p:grpSpPr>
+      <p:sp>
+        <p:nvSpPr>
+          <p:cNvPr id="2" name="タイトル 1"/>
+          <p:cNvSpPr>
+            <a:spLocks noGrp="1"/>
+          </p:cNvSpPr>
+          <p:nvPr>
+            <p:ph type="title"/>
+          </p:nvPr>
+        </p:nvSpPr>
+        <p:spPr/>
+        <p:txBody>
+          <a:bodyPr rtlCol="0"/>
+          <a:lstStyle/>
+          <a:p>
+            <a:pPr rtl="0"/>
+            <a:r>
+              <a:rPr lang="ja-JP" altLang="en-US" noProof="0"/>
+              <a:t>マスター タイトルの書式設定</a:t>
+            </a:r>
+            <a:endParaRPr lang="ja-JP" altLang="en-US" noProof="0" dirty="0"/>
+          </a:p>
+        </p:txBody>
+      </p:sp>
+      <p:sp>
+        <p:nvSpPr>
+          <p:cNvPr id="3" name="コンテンツ プレースホルダー 2"/>
+          <p:cNvSpPr>
+            <a:spLocks noGrp="1"/>
+          </p:cNvSpPr>
+          <p:nvPr>
+            <p:ph idx="1"/>
+          </p:nvPr>
+        </p:nvSpPr>
+        <p:spPr/>
+        <p:txBody>
+          <a:bodyPr rtlCol="0"/>
+          <a:lstStyle/>
+          <a:p>
+            <a:pPr lvl="0" rtl="0"/>
+            <a:r>
+              <a:rPr lang="ja-JP" altLang="en-US" noProof="0"/>
+              <a:t>マスター テキストの書式設定</a:t>
+            </a:r>
+          </a:p>
+          <a:p>
+            <a:pPr lvl="1" rtl="0"/>
+            <a:r>
+              <a:rPr lang="ja-JP" altLang="en-US" noProof="0"/>
+              <a:t>第 </a:t>
+            </a:r>
+            <a:r>
+              <a:rPr lang="en-US" altLang="ja-JP" noProof="0"/>
+              <a:t>2 </a:t>
+            </a:r>
+            <a:r>
+              <a:rPr lang="ja-JP" altLang="en-US" noProof="0"/>
+              <a:t>レベル</a:t>
+            </a:r>
+          </a:p>
+          <a:p>
+            <a:pPr lvl="2" rtl="0"/>
+            <a:r>
+              <a:rPr lang="ja-JP" altLang="en-US" noProof="0"/>
+              <a:t>第 </a:t>
+            </a:r>
+            <a:r>
+              <a:rPr lang="en-US" altLang="ja-JP" noProof="0"/>
+              <a:t>3 </a:t>
+            </a:r>
+            <a:r>
+              <a:rPr lang="ja-JP" altLang="en-US" noProof="0"/>
+              <a:t>レベル</a:t>
+            </a:r>
+          </a:p>
+          <a:p>
+            <a:pPr lvl="3" rtl="0"/>
+            <a:r>
+              <a:rPr lang="ja-JP" altLang="en-US" noProof="0"/>
+              <a:t>第 </a:t>
+            </a:r>
+            <a:r>
+              <a:rPr lang="en-US" altLang="ja-JP" noProof="0"/>
+              <a:t>4 </a:t>
+            </a:r>
+            <a:r>
+              <a:rPr lang="ja-JP" altLang="en-US" noProof="0"/>
+              <a:t>レベル</a:t>
+            </a:r>
+          </a:p>
+          <a:p>
+            <a:pPr lvl="4" rtl="0"/>
+            <a:r>
+              <a:rPr lang="ja-JP" altLang="en-US" noProof="0"/>
+              <a:t>第 </a:t>
+            </a:r>
+            <a:r>
+              <a:rPr lang="en-US" altLang="ja-JP" noProof="0"/>
+              <a:t>5 </a:t>
+            </a:r>
+            <a:r>
+              <a:rPr lang="ja-JP" altLang="en-US" noProof="0"/>
+              <a:t>レベル</a:t>
+            </a:r>
+            <a:endParaRPr lang="ja-JP" altLang="en-US" noProof="0" dirty="0"/>
+          </a:p>
+        </p:txBody>
+      </p:sp>
+      <p:sp>
+        <p:nvSpPr>
+          <p:cNvPr id="4" name="日付プレースホルダー 3"/>
+          <p:cNvSpPr>
+            <a:spLocks noGrp="1"/>
+          </p:cNvSpPr>
+          <p:nvPr>
+            <p:ph type="dt" sz="half" idx="10"/>
+          </p:nvPr>
+        </p:nvSpPr>
+        <p:spPr/>
+        <p:txBody>
+          <a:bodyPr rtlCol="0"/>
+          <a:lstStyle/>
+          <a:p>
+            <a:pPr rtl="0"/>
+            <a:fld id="{F1004C8D-6C76-4892-A136-9C6099763C96}" type="datetime1">
+              <a:rPr lang="ja-JP" altLang="en-US" noProof="0" smtClean="0"/>
+              <a:t>2023/1/26</a:t>
+            </a:fld>
+            <a:endParaRPr lang="ja-JP" altLang="en-US" noProof="0" dirty="0"/>
+          </a:p>
+        </p:txBody>
+      </p:sp>
+      <p:sp>
+        <p:nvSpPr>
+          <p:cNvPr id="5" name="フッター プレースホルダー 4"/>
+          <p:cNvSpPr>
+            <a:spLocks noGrp="1"/>
+          </p:cNvSpPr>
+          <p:nvPr>
+            <p:ph type="ftr" sz="quarter" idx="11"/>
+          </p:nvPr>
+        </p:nvSpPr>
+        <p:spPr/>
+        <p:txBody>
+          <a:bodyPr rtlCol="0"/>
+          <a:lstStyle/>
+          <a:p>
+            <a:pPr rtl="0"/>
+            <a:endParaRPr lang="ja-JP" altLang="en-US" noProof="0" dirty="0"/>
+          </a:p>
+        </p:txBody>
+      </p:sp>
+      <p:sp>
+        <p:nvSpPr>
+          <p:cNvPr id="6" name="スライド番号プレースホルダー 5"/>
+          <p:cNvSpPr>
+            <a:spLocks noGrp="1"/>
+          </p:cNvSpPr>
+          <p:nvPr>
+            <p:ph type="sldNum" sz="quarter" idx="12"/>
+          </p:nvPr>
+        </p:nvSpPr>
+        <p:spPr/>
+        <p:txBody>
+          <a:bodyPr rtlCol="0"/>
+          <a:lstStyle/>
+          <a:p>
+            <a:pPr rtl="0"/>
+            <a:fld id="{3A98EE3D-8CD1-4C3F-BD1C-C98C9596463C}" type="slidenum">
+              <a:rPr lang="en-US" altLang="ja-JP" noProof="0" smtClean="0"/>
+              <a:t>‹#›</a:t>
+            </a:fld>
+            <a:endParaRPr lang="ja-JP" altLang="en-US" noProof="0" dirty="0"/>
+          </a:p>
+        </p:txBody>
+      </p:sp>
+    </p:spTree>
+    <p:extLst>
+      <p:ext uri="{BB962C8B-B14F-4D97-AF65-F5344CB8AC3E}">
+        <p14:creationId xmlns:p14="http://schemas.microsoft.com/office/powerpoint/2010/main" val="37699143"/>
+      </p:ext>
+    </p:extLst>
+  </p:cSld>
+  <p:clrMapOvr>
+    <a:masterClrMapping/>
+  </p:clrMapOvr>
+</p:sldLayout>
+</file>
+
 <file path=ppt/slideLayouts/slideLayout2.xml><?xml version="1.0" encoding="utf-8"?>
 <p:sldLayout xmlns:a="http://schemas.openxmlformats.org/drawingml/2006/main" xmlns:r="http://schemas.openxmlformats.org/officeDocument/2006/relationships" xmlns:p="http://schemas.openxmlformats.org/presentationml/2006/main" preserve="1" userDrawn="1">
   <p:cSld name="議題">
@@ -6717,6 +7102,7 @@
     <p:sldLayoutId id="2147483653" r:id="rId9"/>
     <p:sldLayoutId id="2147483678" r:id="rId10"/>
     <p:sldLayoutId id="2147483680" r:id="rId11"/>
+    <p:sldLayoutId id="2147483681" r:id="rId12"/>
   </p:sldLayoutIdLst>
   <p:hf hdr="0" ftr="0" dt="0"/>
   <p:txStyles>
@@ -7513,6 +7899,592 @@
     <p:extLst>
       <p:ext uri="{BB962C8B-B14F-4D97-AF65-F5344CB8AC3E}">
         <p14:creationId xmlns:p14="http://schemas.microsoft.com/office/powerpoint/2010/main" val="927727573"/>
+      </p:ext>
+    </p:extLst>
+  </p:cSld>
+  <p:clrMapOvr>
+    <a:masterClrMapping/>
+  </p:clrMapOvr>
+</p:sld>
+</file>
+
+<file path=ppt/slides/slide11.xml><?xml version="1.0" encoding="utf-8"?>
+<p:sld xmlns:a="http://schemas.openxmlformats.org/drawingml/2006/main" xmlns:r="http://schemas.openxmlformats.org/officeDocument/2006/relationships" xmlns:p="http://schemas.openxmlformats.org/presentationml/2006/main" show="0">
+  <p:cSld>
+    <p:spTree>
+      <p:nvGrpSpPr>
+        <p:cNvPr id="1" name=""/>
+        <p:cNvGrpSpPr/>
+        <p:nvPr/>
+      </p:nvGrpSpPr>
+      <p:grpSpPr>
+        <a:xfrm>
+          <a:off x="0" y="0"/>
+          <a:ext cx="0" cy="0"/>
+          <a:chOff x="0" y="0"/>
+          <a:chExt cx="0" cy="0"/>
+        </a:xfrm>
+      </p:grpSpPr>
+      <p:sp>
+        <p:nvSpPr>
+          <p:cNvPr id="2" name="タイトル 1">
+            <a:extLst>
+              <a:ext uri="{FF2B5EF4-FFF2-40B4-BE49-F238E27FC236}">
+                <a16:creationId xmlns:a16="http://schemas.microsoft.com/office/drawing/2014/main" id="{30C09A6F-E0B4-A715-7D5F-50830A7AD645}"/>
+              </a:ext>
+            </a:extLst>
+          </p:cNvPr>
+          <p:cNvSpPr>
+            <a:spLocks noGrp="1"/>
+          </p:cNvSpPr>
+          <p:nvPr>
+            <p:ph type="title"/>
+          </p:nvPr>
+        </p:nvSpPr>
+        <p:spPr>
+          <a:xfrm>
+            <a:off x="594519" y="269915"/>
+            <a:ext cx="11002962" cy="823913"/>
+          </a:xfrm>
+        </p:spPr>
+        <p:txBody>
+          <a:bodyPr>
+            <a:normAutofit/>
+          </a:bodyPr>
+          <a:lstStyle/>
+          <a:p>
+            <a:r>
+              <a:rPr kumimoji="1" lang="en-US" altLang="ja-JP" dirty="0" err="1"/>
+              <a:t>EmoBank</a:t>
+            </a:r>
+            <a:endParaRPr kumimoji="1" lang="ja-JP" altLang="en-US" dirty="0"/>
+          </a:p>
+        </p:txBody>
+      </p:sp>
+      <p:sp>
+        <p:nvSpPr>
+          <p:cNvPr id="3" name="コンテンツ プレースホルダー 2">
+            <a:extLst>
+              <a:ext uri="{FF2B5EF4-FFF2-40B4-BE49-F238E27FC236}">
+                <a16:creationId xmlns:a16="http://schemas.microsoft.com/office/drawing/2014/main" id="{3B159DAC-F52F-A1E8-416B-0298C52CE9EF}"/>
+              </a:ext>
+            </a:extLst>
+          </p:cNvPr>
+          <p:cNvSpPr>
+            <a:spLocks noGrp="1"/>
+          </p:cNvSpPr>
+          <p:nvPr>
+            <p:ph idx="1"/>
+          </p:nvPr>
+        </p:nvSpPr>
+        <p:spPr>
+          <a:xfrm>
+            <a:off x="607561" y="5780128"/>
+            <a:ext cx="10989920" cy="4811150"/>
+          </a:xfrm>
+        </p:spPr>
+        <p:txBody>
+          <a:bodyPr/>
+          <a:lstStyle/>
+          <a:p>
+            <a:pPr>
+              <a:lnSpc>
+                <a:spcPct val="100000"/>
+              </a:lnSpc>
+            </a:pPr>
+            <a:r>
+              <a:rPr kumimoji="1" lang="en-US" altLang="ja-JP" sz="1000" dirty="0"/>
+              <a:t>Sven </a:t>
+            </a:r>
+            <a:r>
+              <a:rPr kumimoji="1" lang="en-US" altLang="ja-JP" sz="1000" dirty="0" err="1"/>
+              <a:t>Buechel</a:t>
+            </a:r>
+            <a:r>
+              <a:rPr kumimoji="1" lang="en-US" altLang="ja-JP" sz="1000" dirty="0"/>
+              <a:t> and Udo Hahn. 2017. </a:t>
+            </a:r>
+            <a:r>
+              <a:rPr kumimoji="1" lang="en-US" altLang="ja-JP" sz="1000" dirty="0" err="1"/>
+              <a:t>EmoBank</a:t>
+            </a:r>
+            <a:r>
+              <a:rPr kumimoji="1" lang="en-US" altLang="ja-JP" sz="1000" dirty="0"/>
+              <a:t>: Studying the Impact of Annotation Perspective and Representation Format on Dimensional Emotion Analysis. In EACL 2017 - Proceedings of the 15th Conference of the European Chapter of the Association for Computational Linguistics. Valencia, Spain, April 3-7, 2017. Volume 2, Short Papers, pages 578-585. Available: </a:t>
+            </a:r>
+            <a:r>
+              <a:rPr kumimoji="1" lang="en-US" altLang="ja-JP" sz="1000" dirty="0">
+                <a:hlinkClick r:id="rId3"/>
+              </a:rPr>
+              <a:t>http://aclweb.org/anthology/E17-2092</a:t>
+            </a:r>
+            <a:endParaRPr kumimoji="1" lang="en-US" altLang="ja-JP" sz="1000" dirty="0"/>
+          </a:p>
+          <a:p>
+            <a:pPr>
+              <a:lnSpc>
+                <a:spcPct val="100000"/>
+              </a:lnSpc>
+            </a:pPr>
+            <a:r>
+              <a:rPr kumimoji="1" lang="en-US" altLang="ja-JP" sz="1000" dirty="0"/>
+              <a:t>Sven </a:t>
+            </a:r>
+            <a:r>
+              <a:rPr kumimoji="1" lang="en-US" altLang="ja-JP" sz="1000" dirty="0" err="1"/>
+              <a:t>Buechel</a:t>
+            </a:r>
+            <a:r>
+              <a:rPr kumimoji="1" lang="en-US" altLang="ja-JP" sz="1000" dirty="0"/>
+              <a:t> and Udo Hahn. 2017. Readers vs. writers vs. texts: Coping with different perspectives of text understanding in emotion annotation. In LAW 2017 - Proceedings of the 11th Linguistic Annotation Workshop @ EACL 2017. Valencia, Spain, April 3, 2017, pages 1-12. Available: https://sigann.github.io/LAW-XI-2017/papers/LAW01.pdf</a:t>
+            </a:r>
+            <a:endParaRPr kumimoji="1" lang="ja-JP" altLang="en-US" sz="1000" dirty="0"/>
+          </a:p>
+          <a:p>
+            <a:pPr>
+              <a:lnSpc>
+                <a:spcPct val="100000"/>
+              </a:lnSpc>
+            </a:pPr>
+            <a:endParaRPr kumimoji="1" lang="ja-JP" altLang="en-US" sz="1000" dirty="0"/>
+          </a:p>
+        </p:txBody>
+      </p:sp>
+      <p:pic>
+        <p:nvPicPr>
+          <p:cNvPr id="1026" name="Picture 2" descr="VAD(Valence-Arousal-Dominance) 모델은 ...">
+            <a:extLst>
+              <a:ext uri="{FF2B5EF4-FFF2-40B4-BE49-F238E27FC236}">
+                <a16:creationId xmlns:a16="http://schemas.microsoft.com/office/drawing/2014/main" id="{0A99690C-D806-D14B-82F5-86629AF39297}"/>
+              </a:ext>
+            </a:extLst>
+          </p:cNvPr>
+          <p:cNvPicPr>
+            <a:picLocks noChangeAspect="1" noChangeArrowheads="1"/>
+          </p:cNvPicPr>
+          <p:nvPr/>
+        </p:nvPicPr>
+        <p:blipFill>
+          <a:blip r:embed="rId4">
+            <a:extLst>
+              <a:ext uri="{28A0092B-C50C-407E-A947-70E740481C1C}">
+                <a14:useLocalDpi xmlns:a14="http://schemas.microsoft.com/office/drawing/2010/main" val="0"/>
+              </a:ext>
+            </a:extLst>
+          </a:blip>
+          <a:srcRect/>
+          <a:stretch>
+            <a:fillRect/>
+          </a:stretch>
+        </p:blipFill>
+        <p:spPr bwMode="auto">
+          <a:xfrm>
+            <a:off x="7580244" y="1093828"/>
+            <a:ext cx="4543929" cy="3148676"/>
+          </a:xfrm>
+          <a:prstGeom prst="rect">
+            <a:avLst/>
+          </a:prstGeom>
+          <a:noFill/>
+          <a:extLst>
+            <a:ext uri="{909E8E84-426E-40DD-AFC4-6F175D3DCCD1}">
+              <a14:hiddenFill xmlns:a14="http://schemas.microsoft.com/office/drawing/2010/main">
+                <a:solidFill>
+                  <a:srgbClr val="FFFFFF"/>
+                </a:solidFill>
+              </a14:hiddenFill>
+            </a:ext>
+          </a:extLst>
+        </p:spPr>
+      </p:pic>
+      <p:pic>
+        <p:nvPicPr>
+          <p:cNvPr id="7" name="図 6">
+            <a:extLst>
+              <a:ext uri="{FF2B5EF4-FFF2-40B4-BE49-F238E27FC236}">
+                <a16:creationId xmlns:a16="http://schemas.microsoft.com/office/drawing/2014/main" id="{E76EC9A1-E879-B906-FAC4-78E6B0902716}"/>
+              </a:ext>
+            </a:extLst>
+          </p:cNvPr>
+          <p:cNvPicPr>
+            <a:picLocks noChangeAspect="1"/>
+          </p:cNvPicPr>
+          <p:nvPr/>
+        </p:nvPicPr>
+        <p:blipFill rotWithShape="1">
+          <a:blip r:embed="rId5"/>
+          <a:srcRect l="9021" t="22223" r="28805" b="8888"/>
+          <a:stretch/>
+        </p:blipFill>
+        <p:spPr>
+          <a:xfrm>
+            <a:off x="67827" y="1066800"/>
+            <a:ext cx="7580244" cy="4724400"/>
+          </a:xfrm>
+          <a:prstGeom prst="rect">
+            <a:avLst/>
+          </a:prstGeom>
+        </p:spPr>
+      </p:pic>
+    </p:spTree>
+    <p:extLst>
+      <p:ext uri="{BB962C8B-B14F-4D97-AF65-F5344CB8AC3E}">
+        <p14:creationId xmlns:p14="http://schemas.microsoft.com/office/powerpoint/2010/main" val="3930346119"/>
+      </p:ext>
+    </p:extLst>
+  </p:cSld>
+  <p:clrMapOvr>
+    <a:masterClrMapping/>
+  </p:clrMapOvr>
+</p:sld>
+</file>
+
+<file path=ppt/slides/slide12.xml><?xml version="1.0" encoding="utf-8"?>
+<p:sld xmlns:a="http://schemas.openxmlformats.org/drawingml/2006/main" xmlns:r="http://schemas.openxmlformats.org/officeDocument/2006/relationships" xmlns:p="http://schemas.openxmlformats.org/presentationml/2006/main" show="0">
+  <p:cSld>
+    <p:spTree>
+      <p:nvGrpSpPr>
+        <p:cNvPr id="1" name=""/>
+        <p:cNvGrpSpPr/>
+        <p:nvPr/>
+      </p:nvGrpSpPr>
+      <p:grpSpPr>
+        <a:xfrm>
+          <a:off x="0" y="0"/>
+          <a:ext cx="0" cy="0"/>
+          <a:chOff x="0" y="0"/>
+          <a:chExt cx="0" cy="0"/>
+        </a:xfrm>
+      </p:grpSpPr>
+      <p:sp>
+        <p:nvSpPr>
+          <p:cNvPr id="11" name="タイトル 10">
+            <a:extLst>
+              <a:ext uri="{FF2B5EF4-FFF2-40B4-BE49-F238E27FC236}">
+                <a16:creationId xmlns:a16="http://schemas.microsoft.com/office/drawing/2014/main" id="{497CA5D4-2D6A-CB13-847F-AFE5AB0A2168}"/>
+              </a:ext>
+            </a:extLst>
+          </p:cNvPr>
+          <p:cNvSpPr>
+            <a:spLocks noGrp="1"/>
+          </p:cNvSpPr>
+          <p:nvPr>
+            <p:ph type="title"/>
+          </p:nvPr>
+        </p:nvSpPr>
+        <p:spPr/>
+        <p:txBody>
+          <a:bodyPr/>
+          <a:lstStyle/>
+          <a:p>
+            <a:r>
+              <a:rPr lang="en-US" altLang="ja-JP" dirty="0"/>
+              <a:t>Vader</a:t>
+            </a:r>
+            <a:endParaRPr lang="ja-JP" altLang="en-US" dirty="0"/>
+          </a:p>
+        </p:txBody>
+      </p:sp>
+      <p:sp>
+        <p:nvSpPr>
+          <p:cNvPr id="12" name="テキスト ボックス 11">
+            <a:extLst>
+              <a:ext uri="{FF2B5EF4-FFF2-40B4-BE49-F238E27FC236}">
+                <a16:creationId xmlns:a16="http://schemas.microsoft.com/office/drawing/2014/main" id="{A6C1C83B-A732-9C18-D266-11B008B2C7F8}"/>
+              </a:ext>
+            </a:extLst>
+          </p:cNvPr>
+          <p:cNvSpPr txBox="1"/>
+          <p:nvPr/>
+        </p:nvSpPr>
+        <p:spPr>
+          <a:xfrm>
+            <a:off x="722709" y="5499100"/>
+            <a:ext cx="10746581" cy="923330"/>
+          </a:xfrm>
+          <a:prstGeom prst="rect">
+            <a:avLst/>
+          </a:prstGeom>
+          <a:noFill/>
+        </p:spPr>
+        <p:txBody>
+          <a:bodyPr wrap="square" rtlCol="0">
+            <a:spAutoFit/>
+          </a:bodyPr>
+          <a:lstStyle/>
+          <a:p>
+            <a:r>
+              <a:rPr lang="en-US" altLang="ja-JP" b="0" i="0">
+                <a:effectLst/>
+                <a:latin typeface="Noto Sans" panose="020B0502040504020204" pitchFamily="34" charset="0"/>
+              </a:rPr>
+              <a:t>Hutto, C., and Eric Gilbert. 2014. “VADER: A Parsimonious Rule-Based Model for Sentiment Analysis of Social Media Text”. </a:t>
+            </a:r>
+            <a:r>
+              <a:rPr lang="en-US" altLang="ja-JP" b="0" i="1">
+                <a:effectLst/>
+                <a:latin typeface="Noto Sans" panose="020B0502040504020204" pitchFamily="34" charset="0"/>
+              </a:rPr>
+              <a:t>Proceedings of the International AAAI Conference on Web and Social Media</a:t>
+            </a:r>
+            <a:r>
+              <a:rPr lang="en-US" altLang="ja-JP" b="0" i="0">
+                <a:effectLst/>
+                <a:latin typeface="Noto Sans" panose="020B0502040504020204" pitchFamily="34" charset="0"/>
+              </a:rPr>
+              <a:t> 8 (1):216-25. https://doi.org/10.1609/icwsm.v8i1.14550.</a:t>
+            </a:r>
+            <a:endParaRPr kumimoji="1" lang="ja-JP" altLang="en-US" dirty="0"/>
+          </a:p>
+        </p:txBody>
+      </p:sp>
+      <p:pic>
+        <p:nvPicPr>
+          <p:cNvPr id="16" name="図 15">
+            <a:extLst>
+              <a:ext uri="{FF2B5EF4-FFF2-40B4-BE49-F238E27FC236}">
+                <a16:creationId xmlns:a16="http://schemas.microsoft.com/office/drawing/2014/main" id="{EE1BD29C-B75A-435B-A4FC-397776D36BD2}"/>
+              </a:ext>
+            </a:extLst>
+          </p:cNvPr>
+          <p:cNvPicPr>
+            <a:picLocks noChangeAspect="1"/>
+          </p:cNvPicPr>
+          <p:nvPr/>
+        </p:nvPicPr>
+        <p:blipFill rotWithShape="1">
+          <a:blip r:embed="rId2"/>
+          <a:srcRect l="9432" t="30371" r="11346" b="45370"/>
+          <a:stretch/>
+        </p:blipFill>
+        <p:spPr>
+          <a:xfrm>
+            <a:off x="1781392" y="2063750"/>
+            <a:ext cx="8629215" cy="2730500"/>
+          </a:xfrm>
+          <a:prstGeom prst="rect">
+            <a:avLst/>
+          </a:prstGeom>
+        </p:spPr>
+      </p:pic>
+    </p:spTree>
+    <p:extLst>
+      <p:ext uri="{BB962C8B-B14F-4D97-AF65-F5344CB8AC3E}">
+        <p14:creationId xmlns:p14="http://schemas.microsoft.com/office/powerpoint/2010/main" val="2973683361"/>
+      </p:ext>
+    </p:extLst>
+  </p:cSld>
+  <p:clrMapOvr>
+    <a:masterClrMapping/>
+  </p:clrMapOvr>
+</p:sld>
+</file>
+
+<file path=ppt/slides/slide13.xml><?xml version="1.0" encoding="utf-8"?>
+<p:sld xmlns:a="http://schemas.openxmlformats.org/drawingml/2006/main" xmlns:r="http://schemas.openxmlformats.org/officeDocument/2006/relationships" xmlns:p="http://schemas.openxmlformats.org/presentationml/2006/main" show="0">
+  <p:cSld>
+    <p:spTree>
+      <p:nvGrpSpPr>
+        <p:cNvPr id="1" name=""/>
+        <p:cNvGrpSpPr/>
+        <p:nvPr/>
+      </p:nvGrpSpPr>
+      <p:grpSpPr>
+        <a:xfrm>
+          <a:off x="0" y="0"/>
+          <a:ext cx="0" cy="0"/>
+          <a:chOff x="0" y="0"/>
+          <a:chExt cx="0" cy="0"/>
+        </a:xfrm>
+      </p:grpSpPr>
+      <p:pic>
+        <p:nvPicPr>
+          <p:cNvPr id="1026" name="Picture 2">
+            <a:extLst>
+              <a:ext uri="{FF2B5EF4-FFF2-40B4-BE49-F238E27FC236}">
+                <a16:creationId xmlns:a16="http://schemas.microsoft.com/office/drawing/2014/main" id="{C25886BE-F66C-B8D7-2CA7-B1B344911DD9}"/>
+              </a:ext>
+            </a:extLst>
+          </p:cNvPr>
+          <p:cNvPicPr>
+            <a:picLocks noChangeAspect="1" noChangeArrowheads="1"/>
+          </p:cNvPicPr>
+          <p:nvPr/>
+        </p:nvPicPr>
+        <p:blipFill>
+          <a:blip r:embed="rId3">
+            <a:extLst>
+              <a:ext uri="{28A0092B-C50C-407E-A947-70E740481C1C}">
+                <a14:useLocalDpi xmlns:a14="http://schemas.microsoft.com/office/drawing/2010/main" val="0"/>
+              </a:ext>
+            </a:extLst>
+          </a:blip>
+          <a:srcRect/>
+          <a:stretch>
+            <a:fillRect/>
+          </a:stretch>
+        </p:blipFill>
+        <p:spPr bwMode="auto">
+          <a:xfrm>
+            <a:off x="671511" y="874048"/>
+            <a:ext cx="4297362" cy="5916151"/>
+          </a:xfrm>
+          <a:prstGeom prst="rect">
+            <a:avLst/>
+          </a:prstGeom>
+          <a:noFill/>
+          <a:extLst>
+            <a:ext uri="{909E8E84-426E-40DD-AFC4-6F175D3DCCD1}">
+              <a14:hiddenFill xmlns:a14="http://schemas.microsoft.com/office/drawing/2010/main">
+                <a:solidFill>
+                  <a:srgbClr val="FFFFFF"/>
+                </a:solidFill>
+              </a14:hiddenFill>
+            </a:ext>
+          </a:extLst>
+        </p:spPr>
+      </p:pic>
+      <p:pic>
+        <p:nvPicPr>
+          <p:cNvPr id="1028" name="Picture 4" descr="Bert | Muppet Wiki | Fandom">
+            <a:extLst>
+              <a:ext uri="{FF2B5EF4-FFF2-40B4-BE49-F238E27FC236}">
+                <a16:creationId xmlns:a16="http://schemas.microsoft.com/office/drawing/2014/main" id="{B4C1CFF7-30A5-0657-3B39-0C742712A690}"/>
+              </a:ext>
+            </a:extLst>
+          </p:cNvPr>
+          <p:cNvPicPr>
+            <a:picLocks noChangeAspect="1" noChangeArrowheads="1"/>
+          </p:cNvPicPr>
+          <p:nvPr/>
+        </p:nvPicPr>
+        <p:blipFill>
+          <a:blip r:embed="rId4">
+            <a:extLst>
+              <a:ext uri="{28A0092B-C50C-407E-A947-70E740481C1C}">
+                <a14:useLocalDpi xmlns:a14="http://schemas.microsoft.com/office/drawing/2010/main" val="0"/>
+              </a:ext>
+            </a:extLst>
+          </a:blip>
+          <a:srcRect/>
+          <a:stretch>
+            <a:fillRect/>
+          </a:stretch>
+        </p:blipFill>
+        <p:spPr bwMode="auto">
+          <a:xfrm>
+            <a:off x="7223129" y="935187"/>
+            <a:ext cx="3559172" cy="5922813"/>
+          </a:xfrm>
+          <a:prstGeom prst="rect">
+            <a:avLst/>
+          </a:prstGeom>
+          <a:noFill/>
+          <a:extLst>
+            <a:ext uri="{909E8E84-426E-40DD-AFC4-6F175D3DCCD1}">
+              <a14:hiddenFill xmlns:a14="http://schemas.microsoft.com/office/drawing/2010/main">
+                <a:solidFill>
+                  <a:srgbClr val="FFFFFF"/>
+                </a:solidFill>
+              </a14:hiddenFill>
+            </a:ext>
+          </a:extLst>
+        </p:spPr>
+      </p:pic>
+      <p:sp>
+        <p:nvSpPr>
+          <p:cNvPr id="9" name="テキスト ボックス 8">
+            <a:extLst>
+              <a:ext uri="{FF2B5EF4-FFF2-40B4-BE49-F238E27FC236}">
+                <a16:creationId xmlns:a16="http://schemas.microsoft.com/office/drawing/2014/main" id="{4C5F9063-36A7-7072-BC6B-607E251579AC}"/>
+              </a:ext>
+            </a:extLst>
+          </p:cNvPr>
+          <p:cNvSpPr txBox="1"/>
+          <p:nvPr/>
+        </p:nvSpPr>
+        <p:spPr>
+          <a:xfrm>
+            <a:off x="1337058" y="330199"/>
+            <a:ext cx="3559172" cy="646331"/>
+          </a:xfrm>
+          <a:prstGeom prst="rect">
+            <a:avLst/>
+          </a:prstGeom>
+          <a:noFill/>
+        </p:spPr>
+        <p:txBody>
+          <a:bodyPr wrap="square" rtlCol="0">
+            <a:spAutoFit/>
+          </a:bodyPr>
+          <a:lstStyle/>
+          <a:p>
+            <a:pPr algn="ctr"/>
+            <a:r>
+              <a:rPr kumimoji="1" lang="en-US" altLang="ja-JP" sz="3600" dirty="0">
+                <a:solidFill>
+                  <a:srgbClr val="FFC000"/>
+                </a:solidFill>
+              </a:rPr>
+              <a:t>BART</a:t>
+            </a:r>
+            <a:endParaRPr kumimoji="1" lang="ja-JP" altLang="en-US" sz="3600" dirty="0">
+              <a:solidFill>
+                <a:srgbClr val="FFC000"/>
+              </a:solidFill>
+            </a:endParaRPr>
+          </a:p>
+        </p:txBody>
+      </p:sp>
+      <p:sp>
+        <p:nvSpPr>
+          <p:cNvPr id="10" name="テキスト ボックス 9">
+            <a:extLst>
+              <a:ext uri="{FF2B5EF4-FFF2-40B4-BE49-F238E27FC236}">
+                <a16:creationId xmlns:a16="http://schemas.microsoft.com/office/drawing/2014/main" id="{B1BD1EAF-8A0E-4C89-841A-5494474EDA44}"/>
+              </a:ext>
+            </a:extLst>
+          </p:cNvPr>
+          <p:cNvSpPr txBox="1"/>
+          <p:nvPr/>
+        </p:nvSpPr>
+        <p:spPr>
+          <a:xfrm>
+            <a:off x="7150486" y="330198"/>
+            <a:ext cx="3559172" cy="646331"/>
+          </a:xfrm>
+          <a:prstGeom prst="rect">
+            <a:avLst/>
+          </a:prstGeom>
+          <a:noFill/>
+        </p:spPr>
+        <p:txBody>
+          <a:bodyPr wrap="square" rtlCol="0">
+            <a:spAutoFit/>
+          </a:bodyPr>
+          <a:lstStyle/>
+          <a:p>
+            <a:pPr algn="ctr"/>
+            <a:r>
+              <a:rPr kumimoji="1" lang="en-US" altLang="ja-JP" sz="3600" dirty="0">
+                <a:solidFill>
+                  <a:srgbClr val="002060"/>
+                </a:solidFill>
+              </a:rPr>
+              <a:t>BERT</a:t>
+            </a:r>
+            <a:endParaRPr kumimoji="1" lang="ja-JP" altLang="en-US" sz="3600" dirty="0">
+              <a:solidFill>
+                <a:srgbClr val="002060"/>
+              </a:solidFill>
+            </a:endParaRPr>
+          </a:p>
+        </p:txBody>
+      </p:sp>
+    </p:spTree>
+    <p:extLst>
+      <p:ext uri="{BB962C8B-B14F-4D97-AF65-F5344CB8AC3E}">
+        <p14:creationId xmlns:p14="http://schemas.microsoft.com/office/powerpoint/2010/main" val="3070272995"/>
       </p:ext>
     </p:extLst>
   </p:cSld>
@@ -13314,21 +14286,21 @@
 </file>
 
 <file path=customXml/item1.xml><?xml version="1.0" encoding="utf-8"?>
+<p:properties xmlns:p="http://schemas.microsoft.com/office/2006/metadata/properties" xmlns:xsi="http://www.w3.org/2001/XMLSchema-instance" xmlns:pc="http://schemas.microsoft.com/office/infopath/2007/PartnerControls">
+  <documentManagement>
+    <Status xmlns="71af3243-3dd4-4a8d-8c0d-dd76da1f02a5">Not started</Status>
+    <MediaServiceKeyPoints xmlns="71af3243-3dd4-4a8d-8c0d-dd76da1f02a5" xsi:nil="true"/>
+  </documentManagement>
+</p:properties>
+</file>
+
+<file path=customXml/item2.xml><?xml version="1.0" encoding="utf-8"?>
 <?mso-contentType ?>
 <FormTemplates xmlns="http://schemas.microsoft.com/sharepoint/v3/contenttype/forms">
   <Display>DocumentLibraryForm</Display>
   <Edit>DocumentLibraryForm</Edit>
   <New>DocumentLibraryForm</New>
 </FormTemplates>
-</file>
-
-<file path=customXml/item2.xml><?xml version="1.0" encoding="utf-8"?>
-<p:properties xmlns:p="http://schemas.microsoft.com/office/2006/metadata/properties" xmlns:xsi="http://www.w3.org/2001/XMLSchema-instance" xmlns:pc="http://schemas.microsoft.com/office/infopath/2007/PartnerControls">
-  <documentManagement>
-    <Status xmlns="71af3243-3dd4-4a8d-8c0d-dd76da1f02a5">Not started</Status>
-    <MediaServiceKeyPoints xmlns="71af3243-3dd4-4a8d-8c0d-dd76da1f02a5" xsi:nil="true"/>
-  </documentManagement>
-</p:properties>
 </file>
 
 <file path=customXml/item3.xml><?xml version="1.0" encoding="utf-8"?>
@@ -13553,19 +14525,19 @@
 </file>
 
 <file path=customXml/itemProps1.xml><?xml version="1.0" encoding="utf-8"?>
-<ds:datastoreItem xmlns:ds="http://schemas.openxmlformats.org/officeDocument/2006/customXml" ds:itemID="{1B7E2D32-4FDD-4266-880C-17595B801432}">
+<ds:datastoreItem xmlns:ds="http://schemas.openxmlformats.org/officeDocument/2006/customXml" ds:itemID="{E3D9F223-918A-45AF-9B53-56AB9E5E2182}">
   <ds:schemaRefs>
-    <ds:schemaRef ds:uri="http://schemas.microsoft.com/sharepoint/v3/contenttype/forms"/>
+    <ds:schemaRef ds:uri="http://schemas.microsoft.com/office/2006/metadata/properties"/>
+    <ds:schemaRef ds:uri="http://schemas.microsoft.com/office/infopath/2007/PartnerControls"/>
+    <ds:schemaRef ds:uri="71af3243-3dd4-4a8d-8c0d-dd76da1f02a5"/>
   </ds:schemaRefs>
 </ds:datastoreItem>
 </file>
 
 <file path=customXml/itemProps2.xml><?xml version="1.0" encoding="utf-8"?>
-<ds:datastoreItem xmlns:ds="http://schemas.openxmlformats.org/officeDocument/2006/customXml" ds:itemID="{E3D9F223-918A-45AF-9B53-56AB9E5E2182}">
+<ds:datastoreItem xmlns:ds="http://schemas.openxmlformats.org/officeDocument/2006/customXml" ds:itemID="{1B7E2D32-4FDD-4266-880C-17595B801432}">
   <ds:schemaRefs>
-    <ds:schemaRef ds:uri="http://schemas.microsoft.com/office/2006/metadata/properties"/>
-    <ds:schemaRef ds:uri="http://schemas.microsoft.com/office/infopath/2007/PartnerControls"/>
-    <ds:schemaRef ds:uri="71af3243-3dd4-4a8d-8c0d-dd76da1f02a5"/>
+    <ds:schemaRef ds:uri="http://schemas.microsoft.com/sharepoint/v3/contenttype/forms"/>
   </ds:schemaRefs>
 </ds:datastoreItem>
 </file>

</xml_diff>